<commit_message>
Condense data processing presentation
</commit_message>
<xml_diff>
--- a/poster/data-process.pptx
+++ b/poster/data-process.pptx
@@ -5,8 +5,7 @@
     <p:sldMasterId id="2147483648" r:id="rId1"/>
   </p:sldMasterIdLst>
   <p:sldIdLst>
-    <p:sldId id="257" r:id="rId2"/>
-    <p:sldId id="256" r:id="rId3"/>
+    <p:sldId id="256" r:id="rId2"/>
   </p:sldIdLst>
   <p:sldSz cx="9144000" cy="6858000" type="screen4x3"/>
   <p:notesSz cx="6858000" cy="9144000"/>
@@ -289,7 +288,7 @@
           <a:p>
             <a:fld id="{C99D93E3-A19E-7140-834A-00A7155DDCAA}" type="datetimeFigureOut">
               <a:rPr lang="en-US" smtClean="0"/>
-              <a:t>3/27/2013</a:t>
+              <a:t>3/27/13</a:t>
             </a:fld>
             <a:endParaRPr lang="en-US"/>
           </a:p>
@@ -459,7 +458,7 @@
           <a:p>
             <a:fld id="{C99D93E3-A19E-7140-834A-00A7155DDCAA}" type="datetimeFigureOut">
               <a:rPr lang="en-US" smtClean="0"/>
-              <a:t>3/27/2013</a:t>
+              <a:t>3/27/13</a:t>
             </a:fld>
             <a:endParaRPr lang="en-US"/>
           </a:p>
@@ -639,7 +638,7 @@
           <a:p>
             <a:fld id="{C99D93E3-A19E-7140-834A-00A7155DDCAA}" type="datetimeFigureOut">
               <a:rPr lang="en-US" smtClean="0"/>
-              <a:t>3/27/2013</a:t>
+              <a:t>3/27/13</a:t>
             </a:fld>
             <a:endParaRPr lang="en-US"/>
           </a:p>
@@ -809,7 +808,7 @@
           <a:p>
             <a:fld id="{C99D93E3-A19E-7140-834A-00A7155DDCAA}" type="datetimeFigureOut">
               <a:rPr lang="en-US" smtClean="0"/>
-              <a:t>3/27/2013</a:t>
+              <a:t>3/27/13</a:t>
             </a:fld>
             <a:endParaRPr lang="en-US"/>
           </a:p>
@@ -1055,7 +1054,7 @@
           <a:p>
             <a:fld id="{C99D93E3-A19E-7140-834A-00A7155DDCAA}" type="datetimeFigureOut">
               <a:rPr lang="en-US" smtClean="0"/>
-              <a:t>3/27/2013</a:t>
+              <a:t>3/27/13</a:t>
             </a:fld>
             <a:endParaRPr lang="en-US"/>
           </a:p>
@@ -1343,7 +1342,7 @@
           <a:p>
             <a:fld id="{C99D93E3-A19E-7140-834A-00A7155DDCAA}" type="datetimeFigureOut">
               <a:rPr lang="en-US" smtClean="0"/>
-              <a:t>3/27/2013</a:t>
+              <a:t>3/27/13</a:t>
             </a:fld>
             <a:endParaRPr lang="en-US"/>
           </a:p>
@@ -1765,7 +1764,7 @@
           <a:p>
             <a:fld id="{C99D93E3-A19E-7140-834A-00A7155DDCAA}" type="datetimeFigureOut">
               <a:rPr lang="en-US" smtClean="0"/>
-              <a:t>3/27/2013</a:t>
+              <a:t>3/27/13</a:t>
             </a:fld>
             <a:endParaRPr lang="en-US"/>
           </a:p>
@@ -1883,7 +1882,7 @@
           <a:p>
             <a:fld id="{C99D93E3-A19E-7140-834A-00A7155DDCAA}" type="datetimeFigureOut">
               <a:rPr lang="en-US" smtClean="0"/>
-              <a:t>3/27/2013</a:t>
+              <a:t>3/27/13</a:t>
             </a:fld>
             <a:endParaRPr lang="en-US"/>
           </a:p>
@@ -1978,7 +1977,7 @@
           <a:p>
             <a:fld id="{C99D93E3-A19E-7140-834A-00A7155DDCAA}" type="datetimeFigureOut">
               <a:rPr lang="en-US" smtClean="0"/>
-              <a:t>3/27/2013</a:t>
+              <a:t>3/27/13</a:t>
             </a:fld>
             <a:endParaRPr lang="en-US"/>
           </a:p>
@@ -2255,7 +2254,7 @@
           <a:p>
             <a:fld id="{C99D93E3-A19E-7140-834A-00A7155DDCAA}" type="datetimeFigureOut">
               <a:rPr lang="en-US" smtClean="0"/>
-              <a:t>3/27/2013</a:t>
+              <a:t>3/27/13</a:t>
             </a:fld>
             <a:endParaRPr lang="en-US"/>
           </a:p>
@@ -2508,7 +2507,7 @@
           <a:p>
             <a:fld id="{C99D93E3-A19E-7140-834A-00A7155DDCAA}" type="datetimeFigureOut">
               <a:rPr lang="en-US" smtClean="0"/>
-              <a:t>3/27/2013</a:t>
+              <a:t>3/27/13</a:t>
             </a:fld>
             <a:endParaRPr lang="en-US"/>
           </a:p>
@@ -2721,7 +2720,7 @@
           <a:p>
             <a:fld id="{C99D93E3-A19E-7140-834A-00A7155DDCAA}" type="datetimeFigureOut">
               <a:rPr lang="en-US" smtClean="0"/>
-              <a:t>3/27/2013</a:t>
+              <a:t>3/27/13</a:t>
             </a:fld>
             <a:endParaRPr lang="en-US"/>
           </a:p>
@@ -3098,55 +3097,14 @@
       </p:grpSpPr>
       <p:sp>
         <p:nvSpPr>
-          <p:cNvPr id="7" name="Rectangle 6"/>
+          <p:cNvPr id="27" name="Pentagon 26"/>
           <p:cNvSpPr/>
           <p:nvPr/>
         </p:nvSpPr>
         <p:spPr>
-          <a:xfrm>
-            <a:off x="91440" y="1600200"/>
-            <a:ext cx="8875776" cy="5111496"/>
-          </a:xfrm>
-          <a:prstGeom prst="rect">
-            <a:avLst/>
-          </a:prstGeom>
-          <a:solidFill>
-            <a:srgbClr val="BFD8F7"/>
-          </a:solidFill>
-        </p:spPr>
-        <p:style>
-          <a:lnRef idx="1">
-            <a:schemeClr val="accent1"/>
-          </a:lnRef>
-          <a:fillRef idx="3">
-            <a:schemeClr val="accent1"/>
-          </a:fillRef>
-          <a:effectRef idx="2">
-            <a:schemeClr val="accent1"/>
-          </a:effectRef>
-          <a:fontRef idx="minor">
-            <a:schemeClr val="lt1"/>
-          </a:fontRef>
-        </p:style>
-        <p:txBody>
-          <a:bodyPr rtlCol="0" anchor="ctr"/>
-          <a:lstStyle/>
-          <a:p>
-            <a:pPr algn="ctr"/>
-            <a:endParaRPr lang="en-US"/>
-          </a:p>
-        </p:txBody>
-      </p:sp>
-      <p:sp>
-        <p:nvSpPr>
-          <p:cNvPr id="8" name="Pentagon 7"/>
-          <p:cNvSpPr/>
-          <p:nvPr/>
-        </p:nvSpPr>
-        <p:spPr>
           <a:xfrm rot="5400000">
-            <a:off x="3447597" y="-3190944"/>
-            <a:ext cx="2163459" cy="8875774"/>
+            <a:off x="971756" y="3252634"/>
+            <a:ext cx="2622129" cy="4432300"/>
           </a:xfrm>
           <a:prstGeom prst="homePlate">
             <a:avLst>
@@ -3188,305 +3146,14 @@
       </p:sp>
       <p:sp>
         <p:nvSpPr>
-          <p:cNvPr id="2" name="Title 1"/>
-          <p:cNvSpPr>
-            <a:spLocks noGrp="1"/>
-          </p:cNvSpPr>
-          <p:nvPr>
-            <p:ph type="title"/>
-          </p:nvPr>
-        </p:nvSpPr>
-        <p:spPr>
-          <a:xfrm>
-            <a:off x="292608" y="579438"/>
-            <a:ext cx="8473440" cy="1143000"/>
-          </a:xfrm>
-        </p:spPr>
-        <p:txBody>
-          <a:bodyPr>
-            <a:noAutofit/>
-          </a:bodyPr>
-          <a:lstStyle/>
-          <a:p>
-            <a:r>
-              <a:rPr lang="en-US" sz="5000" dirty="0" smtClean="0">
-                <a:latin typeface="Helvetica Neue"/>
-              </a:rPr>
-              <a:t>Predicting Movie Ratings using IMDB</a:t>
-            </a:r>
-            <a:endParaRPr lang="en-US" sz="5000" dirty="0">
-              <a:latin typeface="Helvetica Neue"/>
-            </a:endParaRPr>
-          </a:p>
-        </p:txBody>
-      </p:sp>
-      <p:sp>
-        <p:nvSpPr>
-          <p:cNvPr id="3" name="Content Placeholder 2"/>
-          <p:cNvSpPr>
-            <a:spLocks noGrp="1"/>
-          </p:cNvSpPr>
-          <p:nvPr>
-            <p:ph idx="1"/>
-          </p:nvPr>
-        </p:nvSpPr>
-        <p:spPr>
-          <a:xfrm>
-            <a:off x="414526" y="2557272"/>
-            <a:ext cx="8229600" cy="4525963"/>
-          </a:xfrm>
-          <a:ln>
-            <a:solidFill>
-              <a:schemeClr val="tx1"/>
-            </a:solidFill>
-          </a:ln>
-        </p:spPr>
-        <p:txBody>
-          <a:bodyPr/>
-          <a:lstStyle/>
-          <a:p>
-            <a:r>
-              <a:rPr lang="en-US" dirty="0" smtClean="0">
-                <a:latin typeface="Helvetica Neue"/>
-              </a:rPr>
-              <a:t>Nicholas </a:t>
-            </a:r>
-            <a:r>
-              <a:rPr lang="en-US" dirty="0" err="1" smtClean="0">
-                <a:latin typeface="Helvetica Neue"/>
-              </a:rPr>
-              <a:t>Amoscato</a:t>
-            </a:r>
-            <a:endParaRPr lang="en-US" dirty="0" smtClean="0">
-              <a:latin typeface="Helvetica Neue"/>
-            </a:endParaRPr>
-          </a:p>
-          <a:p>
-            <a:r>
-              <a:rPr lang="en-US" dirty="0" smtClean="0">
-                <a:latin typeface="Helvetica Neue"/>
-              </a:rPr>
-              <a:t>Julie De Lorenzo</a:t>
-            </a:r>
-          </a:p>
-          <a:p>
-            <a:r>
-              <a:rPr lang="en-US" dirty="0" smtClean="0">
-                <a:latin typeface="Helvetica Neue"/>
-              </a:rPr>
-              <a:t>Chun Ping Ng</a:t>
-            </a:r>
-            <a:endParaRPr lang="en-US" dirty="0">
-              <a:latin typeface="Helvetica Neue"/>
-            </a:endParaRPr>
-          </a:p>
-        </p:txBody>
-      </p:sp>
-    </p:spTree>
-    <p:extLst>
-      <p:ext uri="{BB962C8B-B14F-4D97-AF65-F5344CB8AC3E}">
-        <p14:creationId xmlns:p14="http://schemas.microsoft.com/office/powerpoint/2010/main" val="3741605532"/>
-      </p:ext>
-    </p:extLst>
-  </p:cSld>
-  <p:clrMapOvr>
-    <a:masterClrMapping/>
-  </p:clrMapOvr>
-  <p:timing>
-    <p:tnLst>
-      <p:par>
-        <p:cTn id="1" dur="indefinite" restart="never" nodeType="tmRoot"/>
-      </p:par>
-    </p:tnLst>
-  </p:timing>
-</p:sld>
-</file>
-
-<file path=ppt/slides/slide2.xml><?xml version="1.0" encoding="utf-8"?>
-<p:sld xmlns:a="http://schemas.openxmlformats.org/drawingml/2006/main" xmlns:r="http://schemas.openxmlformats.org/officeDocument/2006/relationships" xmlns:p="http://schemas.openxmlformats.org/presentationml/2006/main">
-  <p:cSld>
-    <p:spTree>
-      <p:nvGrpSpPr>
-        <p:cNvPr id="1" name=""/>
-        <p:cNvGrpSpPr/>
-        <p:nvPr/>
-      </p:nvGrpSpPr>
-      <p:grpSpPr>
-        <a:xfrm>
-          <a:off x="0" y="0"/>
-          <a:ext cx="0" cy="0"/>
-          <a:chOff x="0" y="0"/>
-          <a:chExt cx="0" cy="0"/>
-        </a:xfrm>
-      </p:grpSpPr>
-      <p:sp>
-        <p:nvSpPr>
-          <p:cNvPr id="45" name="TextBox 44"/>
-          <p:cNvSpPr txBox="1"/>
-          <p:nvPr/>
-        </p:nvSpPr>
-        <p:spPr>
-          <a:xfrm>
-            <a:off x="4700936" y="5561733"/>
-            <a:ext cx="4312443" cy="276999"/>
-          </a:xfrm>
-          <a:prstGeom prst="rect">
-            <a:avLst/>
-          </a:prstGeom>
-          <a:noFill/>
-        </p:spPr>
-        <p:txBody>
-          <a:bodyPr wrap="square" rtlCol="0">
-            <a:spAutoFit/>
-          </a:bodyPr>
-          <a:lstStyle/>
-          <a:p>
-            <a:pPr algn="ctr"/>
-            <a:r>
-              <a:rPr lang="en-US" sz="1200" b="1" dirty="0" smtClean="0">
-                <a:latin typeface="Helvetica Neue"/>
-                <a:cs typeface="Helvetica Neue"/>
-              </a:rPr>
-              <a:t>…finally begin actual machine learning aspect</a:t>
-            </a:r>
-            <a:endParaRPr lang="en-US" sz="1200" b="1" dirty="0">
-              <a:latin typeface="Helvetica Neue"/>
-              <a:cs typeface="Helvetica Neue"/>
-            </a:endParaRPr>
-          </a:p>
-        </p:txBody>
-      </p:sp>
-      <p:sp>
-        <p:nvSpPr>
-          <p:cNvPr id="53" name="Pentagon 52"/>
+          <p:cNvPr id="17" name="Pentagon 16"/>
           <p:cNvSpPr/>
           <p:nvPr/>
         </p:nvSpPr>
         <p:spPr>
           <a:xfrm rot="5400000">
-            <a:off x="4721666" y="1136496"/>
-            <a:ext cx="4287847" cy="4310361"/>
-          </a:xfrm>
-          <a:prstGeom prst="homePlate">
-            <a:avLst>
-              <a:gd name="adj" fmla="val 6278"/>
-            </a:avLst>
-          </a:prstGeom>
-          <a:solidFill>
-            <a:srgbClr val="A4BCDF"/>
-          </a:solidFill>
-          <a:ln w="6350" cmpd="sng">
-            <a:solidFill>
-              <a:srgbClr val="707786"/>
-            </a:solidFill>
-          </a:ln>
-          <a:effectLst/>
-        </p:spPr>
-        <p:style>
-          <a:lnRef idx="1">
-            <a:schemeClr val="accent1"/>
-          </a:lnRef>
-          <a:fillRef idx="3">
-            <a:schemeClr val="accent1"/>
-          </a:fillRef>
-          <a:effectRef idx="2">
-            <a:schemeClr val="accent1"/>
-          </a:effectRef>
-          <a:fontRef idx="minor">
-            <a:schemeClr val="lt1"/>
-          </a:fontRef>
-        </p:style>
-        <p:txBody>
-          <a:bodyPr rtlCol="0" anchor="ctr"/>
-          <a:lstStyle/>
-          <a:p>
-            <a:pPr algn="ctr"/>
-            <a:endParaRPr lang="en-US"/>
-          </a:p>
-        </p:txBody>
-      </p:sp>
-      <p:sp>
-        <p:nvSpPr>
-          <p:cNvPr id="56" name="TextBox 55"/>
-          <p:cNvSpPr txBox="1"/>
-          <p:nvPr/>
-        </p:nvSpPr>
-        <p:spPr>
-          <a:xfrm>
-            <a:off x="4710416" y="1325558"/>
-            <a:ext cx="2146742" cy="276999"/>
-          </a:xfrm>
-          <a:prstGeom prst="rect">
-            <a:avLst/>
-          </a:prstGeom>
-          <a:noFill/>
-        </p:spPr>
-        <p:txBody>
-          <a:bodyPr wrap="none" rtlCol="0">
-            <a:spAutoFit/>
-          </a:bodyPr>
-          <a:lstStyle/>
-          <a:p>
-            <a:r>
-              <a:rPr lang="en-US" sz="1200" b="1" dirty="0" smtClean="0">
-                <a:latin typeface="Helvetica Neue"/>
-                <a:cs typeface="Helvetica Neue"/>
-              </a:rPr>
-              <a:t>6. Process Formatted Data</a:t>
-            </a:r>
-            <a:endParaRPr lang="en-US" sz="1200" b="1" dirty="0">
-              <a:latin typeface="Helvetica Neue"/>
-              <a:cs typeface="Helvetica Neue"/>
-            </a:endParaRPr>
-          </a:p>
-        </p:txBody>
-      </p:sp>
-      <p:sp>
-        <p:nvSpPr>
-          <p:cNvPr id="57" name="TextBox 56"/>
-          <p:cNvSpPr txBox="1"/>
-          <p:nvPr/>
-        </p:nvSpPr>
-        <p:spPr>
-          <a:xfrm>
-            <a:off x="4883982" y="1524328"/>
-            <a:ext cx="1479892" cy="230832"/>
-          </a:xfrm>
-          <a:prstGeom prst="rect">
-            <a:avLst/>
-          </a:prstGeom>
-          <a:noFill/>
-        </p:spPr>
-        <p:txBody>
-          <a:bodyPr wrap="none" rtlCol="0">
-            <a:spAutoFit/>
-          </a:bodyPr>
-          <a:lstStyle/>
-          <a:p>
-            <a:r>
-              <a:rPr lang="en-US" sz="900" dirty="0" smtClean="0">
-                <a:latin typeface="Helvetica Neue"/>
-                <a:cs typeface="Helvetica Neue"/>
-              </a:rPr>
-              <a:t>and output two data sets</a:t>
-            </a:r>
-            <a:endParaRPr lang="en-US" sz="900" dirty="0">
-              <a:latin typeface="Helvetica Neue"/>
-              <a:cs typeface="Helvetica Neue"/>
-            </a:endParaRPr>
-          </a:p>
-        </p:txBody>
-      </p:sp>
-      <p:sp>
-        <p:nvSpPr>
-          <p:cNvPr id="37" name="Pentagon 36"/>
-          <p:cNvSpPr/>
-          <p:nvPr/>
-        </p:nvSpPr>
-        <p:spPr>
-          <a:xfrm rot="5400000">
-            <a:off x="1377524" y="3704601"/>
-            <a:ext cx="1813559" cy="4310361"/>
+            <a:off x="1426990" y="1299525"/>
+            <a:ext cx="1711672" cy="4432301"/>
           </a:xfrm>
           <a:prstGeom prst="homePlate">
             <a:avLst>
@@ -3528,296 +3195,14 @@
       </p:sp>
       <p:sp>
         <p:nvSpPr>
-          <p:cNvPr id="38" name="TextBox 37"/>
-          <p:cNvSpPr txBox="1"/>
-          <p:nvPr/>
-        </p:nvSpPr>
-        <p:spPr>
-          <a:xfrm>
-            <a:off x="129131" y="5346271"/>
-            <a:ext cx="2121093" cy="276999"/>
-          </a:xfrm>
-          <a:prstGeom prst="rect">
-            <a:avLst/>
-          </a:prstGeom>
-          <a:noFill/>
-        </p:spPr>
-        <p:txBody>
-          <a:bodyPr wrap="none" rtlCol="0">
-            <a:spAutoFit/>
-          </a:bodyPr>
-          <a:lstStyle/>
-          <a:p>
-            <a:r>
-              <a:rPr lang="en-US" sz="1200" b="1" dirty="0">
-                <a:latin typeface="Helvetica Neue"/>
-                <a:cs typeface="Helvetica Neue"/>
-              </a:rPr>
-              <a:t>4</a:t>
-            </a:r>
-            <a:r>
-              <a:rPr lang="en-US" sz="1200" b="1" dirty="0" smtClean="0">
-                <a:latin typeface="Helvetica Neue"/>
-                <a:cs typeface="Helvetica Neue"/>
-              </a:rPr>
-              <a:t>. Format JSON Response</a:t>
-            </a:r>
-            <a:endParaRPr lang="en-US" sz="1200" b="1" dirty="0">
-              <a:latin typeface="Helvetica Neue"/>
-              <a:cs typeface="Helvetica Neue"/>
-            </a:endParaRPr>
-          </a:p>
-        </p:txBody>
-      </p:sp>
-      <p:sp>
-        <p:nvSpPr>
-          <p:cNvPr id="39" name="TextBox 38"/>
-          <p:cNvSpPr txBox="1"/>
-          <p:nvPr/>
-        </p:nvSpPr>
-        <p:spPr>
-          <a:xfrm>
-            <a:off x="302697" y="5545041"/>
-            <a:ext cx="4099050" cy="230832"/>
-          </a:xfrm>
-          <a:prstGeom prst="rect">
-            <a:avLst/>
-          </a:prstGeom>
-          <a:noFill/>
-        </p:spPr>
-        <p:txBody>
-          <a:bodyPr wrap="none" rtlCol="0">
-            <a:spAutoFit/>
-          </a:bodyPr>
-          <a:lstStyle/>
-          <a:p>
-            <a:r>
-              <a:rPr lang="en-US" sz="900" dirty="0" smtClean="0">
-                <a:latin typeface="Helvetica Neue"/>
-                <a:cs typeface="Helvetica Neue"/>
-              </a:rPr>
-              <a:t>with features separated by tab; multiple feature values separated by comma</a:t>
-            </a:r>
-            <a:endParaRPr lang="en-US" sz="900" dirty="0">
-              <a:latin typeface="Helvetica Neue"/>
-              <a:cs typeface="Helvetica Neue"/>
-            </a:endParaRPr>
-          </a:p>
-        </p:txBody>
-      </p:sp>
-      <p:sp>
-        <p:nvSpPr>
-          <p:cNvPr id="40" name="Rectangle 39"/>
+          <p:cNvPr id="14" name="Pentagon 13"/>
           <p:cNvSpPr/>
           <p:nvPr/>
         </p:nvSpPr>
         <p:spPr>
-          <a:xfrm>
-            <a:off x="302697" y="5849430"/>
-            <a:ext cx="3966634" cy="619104"/>
-          </a:xfrm>
-          <a:prstGeom prst="rect">
-            <a:avLst/>
-          </a:prstGeom>
-          <a:solidFill>
-            <a:schemeClr val="bg1"/>
-          </a:solidFill>
-          <a:ln w="3175" cmpd="sng">
-            <a:solidFill>
-              <a:srgbClr val="707786"/>
-            </a:solidFill>
-          </a:ln>
-          <a:effectLst>
-            <a:innerShdw blurRad="25400" dist="12700" dir="13500000">
-              <a:prstClr val="black">
-                <a:alpha val="25000"/>
-              </a:prstClr>
-            </a:innerShdw>
-          </a:effectLst>
-        </p:spPr>
-        <p:style>
-          <a:lnRef idx="1">
-            <a:schemeClr val="accent1"/>
-          </a:lnRef>
-          <a:fillRef idx="3">
-            <a:schemeClr val="accent1"/>
-          </a:fillRef>
-          <a:effectRef idx="2">
-            <a:schemeClr val="accent1"/>
-          </a:effectRef>
-          <a:fontRef idx="minor">
-            <a:schemeClr val="lt1"/>
-          </a:fontRef>
-        </p:style>
-        <p:txBody>
-          <a:bodyPr rtlCol="0" anchor="ctr"/>
-          <a:lstStyle/>
-          <a:p>
-            <a:pPr algn="ctr"/>
-            <a:endParaRPr lang="en-US"/>
-          </a:p>
-        </p:txBody>
-      </p:sp>
-      <p:sp>
-        <p:nvSpPr>
-          <p:cNvPr id="41" name="Rectangle 40"/>
-          <p:cNvSpPr/>
-          <p:nvPr/>
-        </p:nvSpPr>
-        <p:spPr>
-          <a:xfrm>
-            <a:off x="296753" y="5877548"/>
-            <a:ext cx="3958579" cy="523220"/>
-          </a:xfrm>
-          <a:prstGeom prst="rect">
-            <a:avLst/>
-          </a:prstGeom>
-        </p:spPr>
-        <p:txBody>
-          <a:bodyPr wrap="square">
-            <a:spAutoFit/>
-          </a:bodyPr>
-          <a:lstStyle/>
-          <a:p>
-            <a:r>
-              <a:rPr lang="en-US" sz="700" dirty="0">
-                <a:latin typeface="Courier"/>
-                <a:cs typeface="Courier"/>
-              </a:rPr>
-              <a:t>0</a:t>
-            </a:r>
-            <a:r>
-              <a:rPr lang="en-US" sz="700" dirty="0" smtClean="0">
-                <a:latin typeface="Courier"/>
-                <a:cs typeface="Courier"/>
-              </a:rPr>
-              <a:t>	tt0111161	9.3	864423	Tim </a:t>
-            </a:r>
-            <a:r>
-              <a:rPr lang="en-US" sz="700" dirty="0" err="1" smtClean="0">
-                <a:latin typeface="Courier"/>
-                <a:cs typeface="Courier"/>
-              </a:rPr>
-              <a:t>Robbins,Morgan</a:t>
-            </a:r>
-            <a:r>
-              <a:rPr lang="en-US" sz="700" dirty="0" smtClean="0">
-                <a:latin typeface="Courier"/>
-                <a:cs typeface="Courier"/>
-              </a:rPr>
-              <a:t> </a:t>
-            </a:r>
-            <a:r>
-              <a:rPr lang="en-US" sz="700" dirty="0" err="1" smtClean="0">
-                <a:latin typeface="Courier"/>
-                <a:cs typeface="Courier"/>
-              </a:rPr>
-              <a:t>Freeman,Bob</a:t>
-            </a:r>
-            <a:r>
-              <a:rPr lang="en-US" sz="700" dirty="0" smtClean="0">
-                <a:latin typeface="Courier"/>
-                <a:cs typeface="Courier"/>
-              </a:rPr>
-              <a:t> </a:t>
-            </a:r>
-            <a:r>
-              <a:rPr lang="en-US" sz="700" dirty="0" err="1" smtClean="0">
-                <a:latin typeface="Courier"/>
-                <a:cs typeface="Courier"/>
-              </a:rPr>
-              <a:t>Gunton,William</a:t>
-            </a:r>
-            <a:r>
-              <a:rPr lang="en-US" sz="700" dirty="0" smtClean="0">
-                <a:latin typeface="Courier"/>
-                <a:cs typeface="Courier"/>
-              </a:rPr>
-              <a:t> </a:t>
-            </a:r>
-            <a:r>
-              <a:rPr lang="en-US" sz="700" dirty="0" err="1" smtClean="0">
-                <a:latin typeface="Courier"/>
-                <a:cs typeface="Courier"/>
-              </a:rPr>
-              <a:t>Sadler,Clancy</a:t>
-            </a:r>
-            <a:r>
-              <a:rPr lang="en-US" sz="700" dirty="0" smtClean="0">
-                <a:latin typeface="Courier"/>
-                <a:cs typeface="Courier"/>
-              </a:rPr>
-              <a:t> Brown	Frank </a:t>
-            </a:r>
-            <a:r>
-              <a:rPr lang="en-US" sz="700" dirty="0" err="1" smtClean="0">
-                <a:latin typeface="Courier"/>
-                <a:cs typeface="Courier"/>
-              </a:rPr>
-              <a:t>Darabont</a:t>
-            </a:r>
-            <a:r>
-              <a:rPr lang="en-US" sz="700" dirty="0" smtClean="0">
-                <a:latin typeface="Courier"/>
-                <a:cs typeface="Courier"/>
-              </a:rPr>
-              <a:t>	Stephen </a:t>
-            </a:r>
-            <a:r>
-              <a:rPr lang="en-US" sz="700" dirty="0" err="1" smtClean="0">
-                <a:latin typeface="Courier"/>
-                <a:cs typeface="Courier"/>
-              </a:rPr>
-              <a:t>King,Frank</a:t>
-            </a:r>
-            <a:r>
-              <a:rPr lang="en-US" sz="700" dirty="0" smtClean="0">
-                <a:latin typeface="Courier"/>
-                <a:cs typeface="Courier"/>
-              </a:rPr>
-              <a:t> </a:t>
-            </a:r>
-            <a:r>
-              <a:rPr lang="en-US" sz="700" dirty="0" err="1" smtClean="0">
-                <a:latin typeface="Courier"/>
-                <a:cs typeface="Courier"/>
-              </a:rPr>
-              <a:t>Darabont</a:t>
-            </a:r>
-            <a:r>
-              <a:rPr lang="en-US" sz="700" dirty="0" smtClean="0">
-                <a:latin typeface="Courier"/>
-                <a:cs typeface="Courier"/>
-              </a:rPr>
-              <a:t>	</a:t>
-            </a:r>
-            <a:r>
-              <a:rPr lang="en-US" sz="700" dirty="0" err="1" smtClean="0">
-                <a:latin typeface="Courier"/>
-                <a:cs typeface="Courier"/>
-              </a:rPr>
-              <a:t>Crime,Drama</a:t>
-            </a:r>
-            <a:r>
-              <a:rPr lang="en-US" sz="700" dirty="0" smtClean="0">
-                <a:latin typeface="Courier"/>
-                <a:cs typeface="Courier"/>
-              </a:rPr>
-              <a:t>	English	USA	R	1994	10	14	142</a:t>
-            </a:r>
-          </a:p>
-        </p:txBody>
-      </p:sp>
-      <p:sp>
-        <p:nvSpPr>
-          <p:cNvPr id="27" name="Pentagon 26"/>
-          <p:cNvSpPr/>
-          <p:nvPr/>
-        </p:nvSpPr>
-        <p:spPr>
           <a:xfrm rot="5400000">
-            <a:off x="973231" y="1880026"/>
-            <a:ext cx="2622129" cy="4310361"/>
+            <a:off x="1515291" y="-159561"/>
+            <a:ext cx="1535059" cy="4432300"/>
           </a:xfrm>
           <a:prstGeom prst="homePlate">
             <a:avLst>
@@ -3859,97 +3244,67 @@
       </p:sp>
       <p:sp>
         <p:nvSpPr>
-          <p:cNvPr id="29" name="TextBox 28"/>
-          <p:cNvSpPr txBox="1"/>
-          <p:nvPr/>
-        </p:nvSpPr>
-        <p:spPr>
-          <a:xfrm>
-            <a:off x="129124" y="2961202"/>
-            <a:ext cx="2105623" cy="276999"/>
-          </a:xfrm>
-          <a:prstGeom prst="rect">
-            <a:avLst/>
-          </a:prstGeom>
-          <a:noFill/>
-        </p:spPr>
-        <p:txBody>
-          <a:bodyPr wrap="none" rtlCol="0">
-            <a:spAutoFit/>
-          </a:bodyPr>
-          <a:lstStyle/>
-          <a:p>
-            <a:r>
-              <a:rPr lang="en-US" sz="1200" b="1" dirty="0" smtClean="0">
-                <a:latin typeface="Helvetica Neue"/>
-                <a:cs typeface="Helvetica Neue"/>
-              </a:rPr>
-              <a:t>3. Get Raw Feature Values</a:t>
-            </a:r>
-            <a:endParaRPr lang="en-US" sz="1200" b="1" dirty="0">
-              <a:latin typeface="Helvetica Neue"/>
-              <a:cs typeface="Helvetica Neue"/>
-            </a:endParaRPr>
-          </a:p>
-        </p:txBody>
-      </p:sp>
-      <p:sp>
-        <p:nvSpPr>
-          <p:cNvPr id="30" name="TextBox 29"/>
-          <p:cNvSpPr txBox="1"/>
-          <p:nvPr/>
-        </p:nvSpPr>
-        <p:spPr>
-          <a:xfrm>
-            <a:off x="302690" y="3159972"/>
-            <a:ext cx="1069524" cy="230832"/>
-          </a:xfrm>
-          <a:prstGeom prst="rect">
-            <a:avLst/>
-          </a:prstGeom>
-          <a:noFill/>
-        </p:spPr>
-        <p:txBody>
-          <a:bodyPr wrap="none" rtlCol="0">
-            <a:spAutoFit/>
-          </a:bodyPr>
-          <a:lstStyle/>
-          <a:p>
-            <a:r>
-              <a:rPr lang="en-US" sz="900" dirty="0" smtClean="0">
-                <a:latin typeface="Helvetica Neue"/>
-                <a:cs typeface="Helvetica Neue"/>
-              </a:rPr>
-              <a:t>from </a:t>
-            </a:r>
-            <a:r>
-              <a:rPr lang="en-US" sz="900" dirty="0" err="1" smtClean="0">
-                <a:latin typeface="Helvetica Neue"/>
-                <a:cs typeface="Helvetica Neue"/>
-              </a:rPr>
-              <a:t>imdbapi.org</a:t>
-            </a:r>
-            <a:endParaRPr lang="en-US" sz="900" dirty="0">
-              <a:latin typeface="Helvetica Neue"/>
-              <a:cs typeface="Helvetica Neue"/>
-            </a:endParaRPr>
-          </a:p>
-        </p:txBody>
-      </p:sp>
-      <p:sp>
-        <p:nvSpPr>
-          <p:cNvPr id="17" name="Pentagon 16"/>
+          <p:cNvPr id="52" name="Pentagon 51"/>
           <p:cNvSpPr/>
           <p:nvPr/>
         </p:nvSpPr>
         <p:spPr>
           <a:xfrm rot="5400000">
-            <a:off x="1428462" y="-73081"/>
-            <a:ext cx="1711672" cy="4310361"/>
+            <a:off x="1475795" y="-1523420"/>
+            <a:ext cx="1614052" cy="4432300"/>
           </a:xfrm>
           <a:prstGeom prst="homePlate">
             <a:avLst>
               <a:gd name="adj" fmla="val 10992"/>
+            </a:avLst>
+          </a:prstGeom>
+          <a:solidFill>
+            <a:srgbClr val="FFFFFF"/>
+          </a:solidFill>
+          <a:ln w="6350" cmpd="sng">
+            <a:solidFill>
+              <a:srgbClr val="707786"/>
+            </a:solidFill>
+          </a:ln>
+          <a:effectLst/>
+        </p:spPr>
+        <p:style>
+          <a:lnRef idx="1">
+            <a:schemeClr val="accent1"/>
+          </a:lnRef>
+          <a:fillRef idx="3">
+            <a:schemeClr val="accent1"/>
+          </a:fillRef>
+          <a:effectRef idx="2">
+            <a:schemeClr val="accent1"/>
+          </a:effectRef>
+          <a:fontRef idx="minor">
+            <a:schemeClr val="lt1"/>
+          </a:fontRef>
+        </p:style>
+        <p:txBody>
+          <a:bodyPr rtlCol="0" anchor="ctr"/>
+          <a:lstStyle/>
+          <a:p>
+            <a:pPr algn="ctr"/>
+            <a:endParaRPr lang="en-US"/>
+          </a:p>
+        </p:txBody>
+      </p:sp>
+      <p:sp>
+        <p:nvSpPr>
+          <p:cNvPr id="53" name="Pentagon 52"/>
+          <p:cNvSpPr/>
+          <p:nvPr/>
+        </p:nvSpPr>
+        <p:spPr>
+          <a:xfrm rot="5400000">
+            <a:off x="4725183" y="2420144"/>
+            <a:ext cx="4287847" cy="4410073"/>
+          </a:xfrm>
+          <a:prstGeom prst="homePlate">
+            <a:avLst>
+              <a:gd name="adj" fmla="val 6278"/>
             </a:avLst>
           </a:prstGeom>
           <a:solidFill>
@@ -3987,13 +3342,164 @@
       </p:sp>
       <p:sp>
         <p:nvSpPr>
+          <p:cNvPr id="56" name="TextBox 55"/>
+          <p:cNvSpPr txBox="1"/>
+          <p:nvPr/>
+        </p:nvSpPr>
+        <p:spPr>
+          <a:xfrm>
+            <a:off x="4710416" y="2659058"/>
+            <a:ext cx="2146742" cy="276999"/>
+          </a:xfrm>
+          <a:prstGeom prst="rect">
+            <a:avLst/>
+          </a:prstGeom>
+          <a:noFill/>
+        </p:spPr>
+        <p:txBody>
+          <a:bodyPr wrap="none" rtlCol="0">
+            <a:spAutoFit/>
+          </a:bodyPr>
+          <a:lstStyle/>
+          <a:p>
+            <a:r>
+              <a:rPr lang="en-US" sz="1200" b="1" dirty="0" smtClean="0">
+                <a:latin typeface="Helvetica Neue"/>
+                <a:cs typeface="Helvetica Neue"/>
+              </a:rPr>
+              <a:t>6. Process Formatted Data</a:t>
+            </a:r>
+            <a:endParaRPr lang="en-US" sz="1200" b="1" dirty="0">
+              <a:latin typeface="Helvetica Neue"/>
+              <a:cs typeface="Helvetica Neue"/>
+            </a:endParaRPr>
+          </a:p>
+        </p:txBody>
+      </p:sp>
+      <p:sp>
+        <p:nvSpPr>
+          <p:cNvPr id="57" name="TextBox 56"/>
+          <p:cNvSpPr txBox="1"/>
+          <p:nvPr/>
+        </p:nvSpPr>
+        <p:spPr>
+          <a:xfrm>
+            <a:off x="4883982" y="2857828"/>
+            <a:ext cx="1479892" cy="230832"/>
+          </a:xfrm>
+          <a:prstGeom prst="rect">
+            <a:avLst/>
+          </a:prstGeom>
+          <a:noFill/>
+        </p:spPr>
+        <p:txBody>
+          <a:bodyPr wrap="none" rtlCol="0">
+            <a:spAutoFit/>
+          </a:bodyPr>
+          <a:lstStyle/>
+          <a:p>
+            <a:r>
+              <a:rPr lang="en-US" sz="900" dirty="0" smtClean="0">
+                <a:latin typeface="Helvetica Neue"/>
+                <a:cs typeface="Helvetica Neue"/>
+              </a:rPr>
+              <a:t>and output two data sets</a:t>
+            </a:r>
+            <a:endParaRPr lang="en-US" sz="900" dirty="0">
+              <a:latin typeface="Helvetica Neue"/>
+              <a:cs typeface="Helvetica Neue"/>
+            </a:endParaRPr>
+          </a:p>
+        </p:txBody>
+      </p:sp>
+      <p:sp>
+        <p:nvSpPr>
+          <p:cNvPr id="29" name="TextBox 28"/>
+          <p:cNvSpPr txBox="1"/>
+          <p:nvPr/>
+        </p:nvSpPr>
+        <p:spPr>
+          <a:xfrm>
+            <a:off x="129124" y="4394778"/>
+            <a:ext cx="2105623" cy="276999"/>
+          </a:xfrm>
+          <a:prstGeom prst="rect">
+            <a:avLst/>
+          </a:prstGeom>
+          <a:noFill/>
+        </p:spPr>
+        <p:txBody>
+          <a:bodyPr wrap="none" rtlCol="0">
+            <a:spAutoFit/>
+          </a:bodyPr>
+          <a:lstStyle/>
+          <a:p>
+            <a:r>
+              <a:rPr lang="en-US" sz="1200" b="1" dirty="0" smtClean="0">
+                <a:latin typeface="Helvetica Neue"/>
+                <a:cs typeface="Helvetica Neue"/>
+              </a:rPr>
+              <a:t>3. Get Raw Feature Values</a:t>
+            </a:r>
+            <a:endParaRPr lang="en-US" sz="1200" b="1" dirty="0">
+              <a:latin typeface="Helvetica Neue"/>
+              <a:cs typeface="Helvetica Neue"/>
+            </a:endParaRPr>
+          </a:p>
+        </p:txBody>
+      </p:sp>
+      <p:sp>
+        <p:nvSpPr>
+          <p:cNvPr id="30" name="TextBox 29"/>
+          <p:cNvSpPr txBox="1"/>
+          <p:nvPr/>
+        </p:nvSpPr>
+        <p:spPr>
+          <a:xfrm>
+            <a:off x="302690" y="4593548"/>
+            <a:ext cx="1069524" cy="230832"/>
+          </a:xfrm>
+          <a:prstGeom prst="rect">
+            <a:avLst/>
+          </a:prstGeom>
+          <a:noFill/>
+        </p:spPr>
+        <p:txBody>
+          <a:bodyPr wrap="none" rtlCol="0">
+            <a:spAutoFit/>
+          </a:bodyPr>
+          <a:lstStyle/>
+          <a:p>
+            <a:r>
+              <a:rPr lang="en-US" sz="900" dirty="0" smtClean="0">
+                <a:latin typeface="Helvetica Neue"/>
+                <a:cs typeface="Helvetica Neue"/>
+              </a:rPr>
+              <a:t>from </a:t>
+            </a:r>
+            <a:r>
+              <a:rPr lang="en-US" sz="900" dirty="0" err="1" smtClean="0">
+                <a:latin typeface="Helvetica Neue"/>
+                <a:cs typeface="Helvetica Neue"/>
+              </a:rPr>
+              <a:t>imdbapi.org</a:t>
+            </a:r>
+            <a:endParaRPr lang="en-US" sz="900" dirty="0">
+              <a:latin typeface="Helvetica Neue"/>
+              <a:cs typeface="Helvetica Neue"/>
+            </a:endParaRPr>
+          </a:p>
+        </p:txBody>
+      </p:sp>
+      <p:sp>
+        <p:nvSpPr>
           <p:cNvPr id="20" name="TextBox 19"/>
           <p:cNvSpPr txBox="1"/>
           <p:nvPr/>
         </p:nvSpPr>
         <p:spPr>
           <a:xfrm>
-            <a:off x="129121" y="1429470"/>
+            <a:off x="129121" y="2863046"/>
             <a:ext cx="2115068" cy="276999"/>
           </a:xfrm>
           <a:prstGeom prst="rect">
@@ -4043,7 +3549,7 @@
         </p:nvSpPr>
         <p:spPr>
           <a:xfrm>
-            <a:off x="302687" y="1628240"/>
+            <a:off x="302687" y="3061816"/>
             <a:ext cx="1787669" cy="230832"/>
           </a:xfrm>
           <a:prstGeom prst="rect">
@@ -4080,62 +3586,13 @@
       </p:sp>
       <p:sp>
         <p:nvSpPr>
-          <p:cNvPr id="14" name="Pentagon 13"/>
-          <p:cNvSpPr/>
-          <p:nvPr/>
-        </p:nvSpPr>
-        <p:spPr>
-          <a:xfrm rot="5400000">
-            <a:off x="1566802" y="-1482134"/>
-            <a:ext cx="1434987" cy="4310361"/>
-          </a:xfrm>
-          <a:prstGeom prst="homePlate">
-            <a:avLst>
-              <a:gd name="adj" fmla="val 10992"/>
-            </a:avLst>
-          </a:prstGeom>
-          <a:solidFill>
-            <a:srgbClr val="A4BCDF"/>
-          </a:solidFill>
-          <a:ln w="6350" cmpd="sng">
-            <a:solidFill>
-              <a:srgbClr val="707786"/>
-            </a:solidFill>
-          </a:ln>
-          <a:effectLst/>
-        </p:spPr>
-        <p:style>
-          <a:lnRef idx="1">
-            <a:schemeClr val="accent1"/>
-          </a:lnRef>
-          <a:fillRef idx="3">
-            <a:schemeClr val="accent1"/>
-          </a:fillRef>
-          <a:effectRef idx="2">
-            <a:schemeClr val="accent1"/>
-          </a:effectRef>
-          <a:fontRef idx="minor">
-            <a:schemeClr val="lt1"/>
-          </a:fontRef>
-        </p:style>
-        <p:txBody>
-          <a:bodyPr rtlCol="0" anchor="ctr"/>
-          <a:lstStyle/>
-          <a:p>
-            <a:pPr algn="ctr"/>
-            <a:endParaRPr lang="en-US"/>
-          </a:p>
-        </p:txBody>
-      </p:sp>
-      <p:sp>
-        <p:nvSpPr>
           <p:cNvPr id="15" name="Rectangle 14"/>
           <p:cNvSpPr/>
           <p:nvPr/>
         </p:nvSpPr>
         <p:spPr>
           <a:xfrm>
-            <a:off x="300979" y="545511"/>
+            <a:off x="300979" y="1979087"/>
             <a:ext cx="3966634" cy="612306"/>
           </a:xfrm>
           <a:prstGeom prst="rect">
@@ -4188,7 +3645,7 @@
         </p:nvSpPr>
         <p:spPr>
           <a:xfrm>
-            <a:off x="309034" y="568316"/>
+            <a:off x="309034" y="2001892"/>
             <a:ext cx="3958579" cy="523220"/>
           </a:xfrm>
           <a:prstGeom prst="rect">
@@ -4285,7 +3742,7 @@
         </p:nvSpPr>
         <p:spPr>
           <a:xfrm>
-            <a:off x="129118" y="82556"/>
+            <a:off x="129118" y="1516132"/>
             <a:ext cx="2419091" cy="276999"/>
           </a:xfrm>
           <a:prstGeom prst="rect">
@@ -4335,7 +3792,7 @@
         </p:nvSpPr>
         <p:spPr>
           <a:xfrm>
-            <a:off x="302684" y="281326"/>
+            <a:off x="302684" y="1714902"/>
             <a:ext cx="1456998" cy="230832"/>
           </a:xfrm>
           <a:prstGeom prst="rect">
@@ -4378,7 +3835,7 @@
         </p:nvSpPr>
         <p:spPr>
           <a:xfrm>
-            <a:off x="302687" y="1905115"/>
+            <a:off x="302687" y="3338691"/>
             <a:ext cx="1905415" cy="612306"/>
           </a:xfrm>
           <a:prstGeom prst="rect">
@@ -4431,7 +3888,7 @@
         </p:nvSpPr>
         <p:spPr>
           <a:xfrm>
-            <a:off x="2360502" y="1905115"/>
+            <a:off x="2360502" y="3338691"/>
             <a:ext cx="1905415" cy="612306"/>
           </a:xfrm>
           <a:prstGeom prst="rect">
@@ -4484,7 +3941,7 @@
         </p:nvSpPr>
         <p:spPr>
           <a:xfrm>
-            <a:off x="2362200" y="1945495"/>
+            <a:off x="2362200" y="3379071"/>
             <a:ext cx="1905416" cy="523220"/>
           </a:xfrm>
           <a:prstGeom prst="rect">
@@ -4584,7 +4041,7 @@
         </p:nvSpPr>
         <p:spPr>
           <a:xfrm>
-            <a:off x="296746" y="1945495"/>
+            <a:off x="296746" y="3379071"/>
             <a:ext cx="1905416" cy="523220"/>
           </a:xfrm>
           <a:prstGeom prst="rect">
@@ -4656,7 +4113,7 @@
         </p:nvSpPr>
         <p:spPr>
           <a:xfrm>
-            <a:off x="2167465" y="2027765"/>
+            <a:off x="2167465" y="3461341"/>
             <a:ext cx="237067" cy="360516"/>
           </a:xfrm>
           <a:prstGeom prst="rightArrow">
@@ -4706,7 +4163,7 @@
         </p:nvSpPr>
         <p:spPr>
           <a:xfrm>
-            <a:off x="302690" y="3455894"/>
+            <a:off x="302690" y="4889470"/>
             <a:ext cx="3966634" cy="1497106"/>
           </a:xfrm>
           <a:prstGeom prst="rect">
@@ -4759,7 +4216,7 @@
         </p:nvSpPr>
         <p:spPr>
           <a:xfrm>
-            <a:off x="296746" y="3492479"/>
+            <a:off x="296746" y="4926055"/>
             <a:ext cx="3958579" cy="1477327"/>
           </a:xfrm>
           <a:prstGeom prst="rect">
@@ -4832,7 +4289,7 @@
         </p:nvSpPr>
         <p:spPr>
           <a:xfrm>
-            <a:off x="374651" y="4567757"/>
+            <a:off x="374651" y="6001333"/>
             <a:ext cx="3803650" cy="341172"/>
           </a:xfrm>
           <a:prstGeom prst="rect">
@@ -4886,8 +4343,8 @@
         </p:nvSpPr>
         <p:spPr>
           <a:xfrm rot="5400000">
-            <a:off x="6182969" y="-1517002"/>
-            <a:ext cx="1365249" cy="4310361"/>
+            <a:off x="6186486" y="-233356"/>
+            <a:ext cx="1365249" cy="4410076"/>
           </a:xfrm>
           <a:prstGeom prst="homePlate">
             <a:avLst>
@@ -4895,7 +4352,7 @@
             </a:avLst>
           </a:prstGeom>
           <a:solidFill>
-            <a:srgbClr val="BFD8F7"/>
+            <a:srgbClr val="A4BCDF"/>
           </a:solidFill>
           <a:ln w="6350" cmpd="sng">
             <a:solidFill>
@@ -4935,7 +4392,7 @@
         </p:nvSpPr>
         <p:spPr>
           <a:xfrm>
-            <a:off x="4710417" y="82556"/>
+            <a:off x="4710417" y="1416056"/>
             <a:ext cx="1275872" cy="276999"/>
           </a:xfrm>
           <a:prstGeom prst="rect">
@@ -4978,7 +4435,7 @@
         </p:nvSpPr>
         <p:spPr>
           <a:xfrm>
-            <a:off x="4883983" y="323661"/>
+            <a:off x="4883983" y="1657161"/>
             <a:ext cx="4006225" cy="784830"/>
           </a:xfrm>
           <a:prstGeom prst="rect">
@@ -5168,7 +4625,7 @@
         </p:nvSpPr>
         <p:spPr>
           <a:xfrm>
-            <a:off x="4909212" y="2981471"/>
+            <a:off x="4909212" y="4314971"/>
             <a:ext cx="3951803" cy="1477328"/>
           </a:xfrm>
           <a:prstGeom prst="rect">
@@ -5438,7 +4895,7 @@
         </p:nvSpPr>
         <p:spPr>
           <a:xfrm>
-            <a:off x="4908380" y="2103761"/>
+            <a:off x="4908380" y="3437261"/>
             <a:ext cx="3966634" cy="556340"/>
           </a:xfrm>
           <a:prstGeom prst="rect">
@@ -5491,7 +4948,7 @@
         </p:nvSpPr>
         <p:spPr>
           <a:xfrm>
-            <a:off x="4902436" y="2140346"/>
+            <a:off x="4902436" y="3473846"/>
             <a:ext cx="3958579" cy="461665"/>
           </a:xfrm>
           <a:prstGeom prst="rect">
@@ -5808,7 +5265,7 @@
         </p:nvSpPr>
         <p:spPr>
           <a:xfrm>
-            <a:off x="4820482" y="1816034"/>
+            <a:off x="4820482" y="3149534"/>
             <a:ext cx="3583032" cy="246221"/>
           </a:xfrm>
           <a:prstGeom prst="rect">
@@ -5851,7 +5308,7 @@
         </p:nvSpPr>
         <p:spPr>
           <a:xfrm>
-            <a:off x="4820482" y="2754396"/>
+            <a:off x="4820482" y="4087896"/>
             <a:ext cx="4037195" cy="246221"/>
           </a:xfrm>
           <a:prstGeom prst="rect">
@@ -5894,7 +5351,7 @@
         </p:nvSpPr>
         <p:spPr>
           <a:xfrm>
-            <a:off x="4883480" y="4515138"/>
+            <a:off x="4883480" y="5848638"/>
             <a:ext cx="3966634" cy="556340"/>
           </a:xfrm>
           <a:prstGeom prst="rect">
@@ -5947,7 +5404,7 @@
         </p:nvSpPr>
         <p:spPr>
           <a:xfrm>
-            <a:off x="4877536" y="4551723"/>
+            <a:off x="4877536" y="5885223"/>
             <a:ext cx="3958579" cy="461665"/>
           </a:xfrm>
           <a:prstGeom prst="rect">
@@ -6256,6 +5713,582 @@
           </a:p>
         </p:txBody>
       </p:sp>
+      <p:sp>
+        <p:nvSpPr>
+          <p:cNvPr id="37" name="Pentagon 36"/>
+          <p:cNvSpPr/>
+          <p:nvPr/>
+        </p:nvSpPr>
+        <p:spPr>
+          <a:xfrm rot="5400000">
+            <a:off x="6056649" y="-1506868"/>
+            <a:ext cx="1624936" cy="4410079"/>
+          </a:xfrm>
+          <a:prstGeom prst="homePlate">
+            <a:avLst>
+              <a:gd name="adj" fmla="val 10992"/>
+            </a:avLst>
+          </a:prstGeom>
+          <a:solidFill>
+            <a:srgbClr val="BFD8F7"/>
+          </a:solidFill>
+          <a:ln w="6350" cmpd="sng">
+            <a:solidFill>
+              <a:srgbClr val="707786"/>
+            </a:solidFill>
+          </a:ln>
+          <a:effectLst/>
+        </p:spPr>
+        <p:style>
+          <a:lnRef idx="1">
+            <a:schemeClr val="accent1"/>
+          </a:lnRef>
+          <a:fillRef idx="3">
+            <a:schemeClr val="accent1"/>
+          </a:fillRef>
+          <a:effectRef idx="2">
+            <a:schemeClr val="accent1"/>
+          </a:effectRef>
+          <a:fontRef idx="minor">
+            <a:schemeClr val="lt1"/>
+          </a:fontRef>
+        </p:style>
+        <p:txBody>
+          <a:bodyPr rtlCol="0" anchor="ctr"/>
+          <a:lstStyle/>
+          <a:p>
+            <a:pPr algn="ctr"/>
+            <a:endParaRPr lang="en-US"/>
+          </a:p>
+        </p:txBody>
+      </p:sp>
+      <p:sp>
+        <p:nvSpPr>
+          <p:cNvPr id="38" name="TextBox 37"/>
+          <p:cNvSpPr txBox="1"/>
+          <p:nvPr/>
+        </p:nvSpPr>
+        <p:spPr>
+          <a:xfrm>
+            <a:off x="4710425" y="90346"/>
+            <a:ext cx="2121093" cy="276999"/>
+          </a:xfrm>
+          <a:prstGeom prst="rect">
+            <a:avLst/>
+          </a:prstGeom>
+          <a:noFill/>
+        </p:spPr>
+        <p:txBody>
+          <a:bodyPr wrap="none" rtlCol="0">
+            <a:spAutoFit/>
+          </a:bodyPr>
+          <a:lstStyle/>
+          <a:p>
+            <a:r>
+              <a:rPr lang="en-US" sz="1200" b="1" dirty="0">
+                <a:latin typeface="Helvetica Neue"/>
+                <a:cs typeface="Helvetica Neue"/>
+              </a:rPr>
+              <a:t>4</a:t>
+            </a:r>
+            <a:r>
+              <a:rPr lang="en-US" sz="1200" b="1" dirty="0" smtClean="0">
+                <a:latin typeface="Helvetica Neue"/>
+                <a:cs typeface="Helvetica Neue"/>
+              </a:rPr>
+              <a:t>. Format JSON Response</a:t>
+            </a:r>
+            <a:endParaRPr lang="en-US" sz="1200" b="1" dirty="0">
+              <a:latin typeface="Helvetica Neue"/>
+              <a:cs typeface="Helvetica Neue"/>
+            </a:endParaRPr>
+          </a:p>
+        </p:txBody>
+      </p:sp>
+      <p:sp>
+        <p:nvSpPr>
+          <p:cNvPr id="39" name="TextBox 38"/>
+          <p:cNvSpPr txBox="1"/>
+          <p:nvPr/>
+        </p:nvSpPr>
+        <p:spPr>
+          <a:xfrm>
+            <a:off x="4883991" y="289116"/>
+            <a:ext cx="4099050" cy="230832"/>
+          </a:xfrm>
+          <a:prstGeom prst="rect">
+            <a:avLst/>
+          </a:prstGeom>
+          <a:noFill/>
+        </p:spPr>
+        <p:txBody>
+          <a:bodyPr wrap="none" rtlCol="0">
+            <a:spAutoFit/>
+          </a:bodyPr>
+          <a:lstStyle/>
+          <a:p>
+            <a:r>
+              <a:rPr lang="en-US" sz="900" dirty="0" smtClean="0">
+                <a:latin typeface="Helvetica Neue"/>
+                <a:cs typeface="Helvetica Neue"/>
+              </a:rPr>
+              <a:t>with features separated by tab; multiple feature values separated by comma</a:t>
+            </a:r>
+            <a:endParaRPr lang="en-US" sz="900" dirty="0">
+              <a:latin typeface="Helvetica Neue"/>
+              <a:cs typeface="Helvetica Neue"/>
+            </a:endParaRPr>
+          </a:p>
+        </p:txBody>
+      </p:sp>
+      <p:sp>
+        <p:nvSpPr>
+          <p:cNvPr id="40" name="Rectangle 39"/>
+          <p:cNvSpPr/>
+          <p:nvPr/>
+        </p:nvSpPr>
+        <p:spPr>
+          <a:xfrm>
+            <a:off x="4883991" y="593505"/>
+            <a:ext cx="3966634" cy="619104"/>
+          </a:xfrm>
+          <a:prstGeom prst="rect">
+            <a:avLst/>
+          </a:prstGeom>
+          <a:solidFill>
+            <a:schemeClr val="bg1"/>
+          </a:solidFill>
+          <a:ln w="3175" cmpd="sng">
+            <a:solidFill>
+              <a:srgbClr val="707786"/>
+            </a:solidFill>
+          </a:ln>
+          <a:effectLst>
+            <a:innerShdw blurRad="25400" dist="12700" dir="13500000">
+              <a:prstClr val="black">
+                <a:alpha val="25000"/>
+              </a:prstClr>
+            </a:innerShdw>
+          </a:effectLst>
+        </p:spPr>
+        <p:style>
+          <a:lnRef idx="1">
+            <a:schemeClr val="accent1"/>
+          </a:lnRef>
+          <a:fillRef idx="3">
+            <a:schemeClr val="accent1"/>
+          </a:fillRef>
+          <a:effectRef idx="2">
+            <a:schemeClr val="accent1"/>
+          </a:effectRef>
+          <a:fontRef idx="minor">
+            <a:schemeClr val="lt1"/>
+          </a:fontRef>
+        </p:style>
+        <p:txBody>
+          <a:bodyPr rtlCol="0" anchor="ctr"/>
+          <a:lstStyle/>
+          <a:p>
+            <a:pPr algn="ctr"/>
+            <a:endParaRPr lang="en-US"/>
+          </a:p>
+        </p:txBody>
+      </p:sp>
+      <p:sp>
+        <p:nvSpPr>
+          <p:cNvPr id="41" name="Rectangle 40"/>
+          <p:cNvSpPr/>
+          <p:nvPr/>
+        </p:nvSpPr>
+        <p:spPr>
+          <a:xfrm>
+            <a:off x="4878047" y="621623"/>
+            <a:ext cx="3958579" cy="523220"/>
+          </a:xfrm>
+          <a:prstGeom prst="rect">
+            <a:avLst/>
+          </a:prstGeom>
+        </p:spPr>
+        <p:txBody>
+          <a:bodyPr wrap="square">
+            <a:spAutoFit/>
+          </a:bodyPr>
+          <a:lstStyle/>
+          <a:p>
+            <a:r>
+              <a:rPr lang="en-US" sz="700" dirty="0">
+                <a:latin typeface="Courier"/>
+                <a:cs typeface="Courier"/>
+              </a:rPr>
+              <a:t>0</a:t>
+            </a:r>
+            <a:r>
+              <a:rPr lang="en-US" sz="700" dirty="0" smtClean="0">
+                <a:latin typeface="Courier"/>
+                <a:cs typeface="Courier"/>
+              </a:rPr>
+              <a:t>	tt0111161	9.3	864423	Tim </a:t>
+            </a:r>
+            <a:r>
+              <a:rPr lang="en-US" sz="700" dirty="0" err="1" smtClean="0">
+                <a:latin typeface="Courier"/>
+                <a:cs typeface="Courier"/>
+              </a:rPr>
+              <a:t>Robbins,Morgan</a:t>
+            </a:r>
+            <a:r>
+              <a:rPr lang="en-US" sz="700" dirty="0" smtClean="0">
+                <a:latin typeface="Courier"/>
+                <a:cs typeface="Courier"/>
+              </a:rPr>
+              <a:t> </a:t>
+            </a:r>
+            <a:r>
+              <a:rPr lang="en-US" sz="700" dirty="0" err="1" smtClean="0">
+                <a:latin typeface="Courier"/>
+                <a:cs typeface="Courier"/>
+              </a:rPr>
+              <a:t>Freeman,Bob</a:t>
+            </a:r>
+            <a:r>
+              <a:rPr lang="en-US" sz="700" dirty="0" smtClean="0">
+                <a:latin typeface="Courier"/>
+                <a:cs typeface="Courier"/>
+              </a:rPr>
+              <a:t> </a:t>
+            </a:r>
+            <a:r>
+              <a:rPr lang="en-US" sz="700" dirty="0" err="1" smtClean="0">
+                <a:latin typeface="Courier"/>
+                <a:cs typeface="Courier"/>
+              </a:rPr>
+              <a:t>Gunton,William</a:t>
+            </a:r>
+            <a:r>
+              <a:rPr lang="en-US" sz="700" dirty="0" smtClean="0">
+                <a:latin typeface="Courier"/>
+                <a:cs typeface="Courier"/>
+              </a:rPr>
+              <a:t> </a:t>
+            </a:r>
+            <a:r>
+              <a:rPr lang="en-US" sz="700" dirty="0" err="1" smtClean="0">
+                <a:latin typeface="Courier"/>
+                <a:cs typeface="Courier"/>
+              </a:rPr>
+              <a:t>Sadler,Clancy</a:t>
+            </a:r>
+            <a:r>
+              <a:rPr lang="en-US" sz="700" dirty="0" smtClean="0">
+                <a:latin typeface="Courier"/>
+                <a:cs typeface="Courier"/>
+              </a:rPr>
+              <a:t> Brown	Frank </a:t>
+            </a:r>
+            <a:r>
+              <a:rPr lang="en-US" sz="700" dirty="0" err="1" smtClean="0">
+                <a:latin typeface="Courier"/>
+                <a:cs typeface="Courier"/>
+              </a:rPr>
+              <a:t>Darabont</a:t>
+            </a:r>
+            <a:r>
+              <a:rPr lang="en-US" sz="700" dirty="0" smtClean="0">
+                <a:latin typeface="Courier"/>
+                <a:cs typeface="Courier"/>
+              </a:rPr>
+              <a:t>	Stephen </a:t>
+            </a:r>
+            <a:r>
+              <a:rPr lang="en-US" sz="700" dirty="0" err="1" smtClean="0">
+                <a:latin typeface="Courier"/>
+                <a:cs typeface="Courier"/>
+              </a:rPr>
+              <a:t>King,Frank</a:t>
+            </a:r>
+            <a:r>
+              <a:rPr lang="en-US" sz="700" dirty="0" smtClean="0">
+                <a:latin typeface="Courier"/>
+                <a:cs typeface="Courier"/>
+              </a:rPr>
+              <a:t> </a:t>
+            </a:r>
+            <a:r>
+              <a:rPr lang="en-US" sz="700" dirty="0" err="1" smtClean="0">
+                <a:latin typeface="Courier"/>
+                <a:cs typeface="Courier"/>
+              </a:rPr>
+              <a:t>Darabont</a:t>
+            </a:r>
+            <a:r>
+              <a:rPr lang="en-US" sz="700" dirty="0" smtClean="0">
+                <a:latin typeface="Courier"/>
+                <a:cs typeface="Courier"/>
+              </a:rPr>
+              <a:t>	</a:t>
+            </a:r>
+            <a:r>
+              <a:rPr lang="en-US" sz="700" dirty="0" err="1" smtClean="0">
+                <a:latin typeface="Courier"/>
+                <a:cs typeface="Courier"/>
+              </a:rPr>
+              <a:t>Crime,Drama</a:t>
+            </a:r>
+            <a:r>
+              <a:rPr lang="en-US" sz="700" dirty="0" smtClean="0">
+                <a:latin typeface="Courier"/>
+                <a:cs typeface="Courier"/>
+              </a:rPr>
+              <a:t>	English	USA	R	1994	10	14	142</a:t>
+            </a:r>
+          </a:p>
+        </p:txBody>
+      </p:sp>
+      <p:sp>
+        <p:nvSpPr>
+          <p:cNvPr id="44" name="TextBox 43"/>
+          <p:cNvSpPr txBox="1"/>
+          <p:nvPr/>
+        </p:nvSpPr>
+        <p:spPr>
+          <a:xfrm>
+            <a:off x="129114" y="24076"/>
+            <a:ext cx="4310366" cy="480517"/>
+          </a:xfrm>
+          <a:prstGeom prst="rect">
+            <a:avLst/>
+          </a:prstGeom>
+          <a:noFill/>
+          <a:effectLst/>
+        </p:spPr>
+        <p:txBody>
+          <a:bodyPr wrap="square" lIns="292988" tIns="146495" rIns="292988" bIns="146495" rtlCol="0">
+            <a:spAutoFit/>
+          </a:bodyPr>
+          <a:lstStyle/>
+          <a:p>
+            <a:pPr algn="ctr"/>
+            <a:r>
+              <a:rPr lang="en-US" sz="1200" b="1" dirty="0" smtClean="0">
+                <a:latin typeface="Raleway"/>
+                <a:cs typeface="Raleway"/>
+              </a:rPr>
+              <a:t>PREDICTING THE NEXT</a:t>
+            </a:r>
+            <a:endParaRPr lang="en-US" sz="1200" b="1" dirty="0">
+              <a:latin typeface="Raleway"/>
+              <a:cs typeface="Raleway"/>
+            </a:endParaRPr>
+          </a:p>
+        </p:txBody>
+      </p:sp>
+      <p:sp>
+        <p:nvSpPr>
+          <p:cNvPr id="47" name="TextBox 46"/>
+          <p:cNvSpPr txBox="1"/>
+          <p:nvPr/>
+        </p:nvSpPr>
+        <p:spPr>
+          <a:xfrm>
+            <a:off x="129115" y="840410"/>
+            <a:ext cx="4310364" cy="457434"/>
+          </a:xfrm>
+          <a:prstGeom prst="rect">
+            <a:avLst/>
+          </a:prstGeom>
+          <a:noFill/>
+          <a:effectLst/>
+        </p:spPr>
+        <p:txBody>
+          <a:bodyPr wrap="square" lIns="292988" tIns="146495" rIns="292988" bIns="146495" rtlCol="0">
+            <a:spAutoFit/>
+          </a:bodyPr>
+          <a:lstStyle/>
+          <a:p>
+            <a:pPr algn="ctr"/>
+            <a:r>
+              <a:rPr lang="en-US" sz="1050" dirty="0" smtClean="0">
+                <a:latin typeface="Raleway"/>
+                <a:cs typeface="Raleway"/>
+              </a:rPr>
+              <a:t>Nicholas Amoscato</a:t>
+            </a:r>
+            <a:r>
+              <a:rPr lang="en-US" sz="1050" dirty="0">
+                <a:latin typeface="Raleway"/>
+                <a:cs typeface="Raleway"/>
+              </a:rPr>
+              <a:t> </a:t>
+            </a:r>
+            <a:r>
+              <a:rPr lang="en-US" sz="1050" dirty="0" smtClean="0">
+                <a:latin typeface="Wingdings"/>
+                <a:ea typeface="Wingdings"/>
+                <a:cs typeface="Wingdings"/>
+                <a:sym typeface="Wingdings"/>
+              </a:rPr>
+              <a:t></a:t>
+            </a:r>
+            <a:r>
+              <a:rPr lang="en-US" sz="1050" dirty="0" smtClean="0">
+                <a:latin typeface="Raleway"/>
+                <a:cs typeface="Raleway"/>
+              </a:rPr>
+              <a:t> Julie De </a:t>
+            </a:r>
+            <a:r>
+              <a:rPr lang="en-US" sz="1050" dirty="0">
+                <a:latin typeface="Raleway"/>
+                <a:cs typeface="Raleway"/>
+              </a:rPr>
+              <a:t>Lorenzo </a:t>
+            </a:r>
+            <a:r>
+              <a:rPr lang="en-US" sz="1050" dirty="0">
+                <a:latin typeface="Wingdings"/>
+                <a:ea typeface="Wingdings"/>
+                <a:cs typeface="Wingdings"/>
+                <a:sym typeface="Wingdings"/>
+              </a:rPr>
+              <a:t></a:t>
+            </a:r>
+            <a:r>
+              <a:rPr lang="en-US" sz="1050" dirty="0">
+                <a:latin typeface="Raleway"/>
+                <a:cs typeface="Raleway"/>
+              </a:rPr>
+              <a:t> Chun </a:t>
+            </a:r>
+            <a:r>
+              <a:rPr lang="en-US" sz="1050" dirty="0" smtClean="0">
+                <a:latin typeface="Raleway"/>
+                <a:cs typeface="Raleway"/>
+              </a:rPr>
+              <a:t>Ping Ng</a:t>
+            </a:r>
+            <a:endParaRPr lang="en-US" sz="1050" dirty="0">
+              <a:latin typeface="Raleway"/>
+              <a:cs typeface="Raleway"/>
+            </a:endParaRPr>
+          </a:p>
+        </p:txBody>
+      </p:sp>
+      <p:sp>
+        <p:nvSpPr>
+          <p:cNvPr id="48" name="TextBox 47"/>
+          <p:cNvSpPr txBox="1"/>
+          <p:nvPr/>
+        </p:nvSpPr>
+        <p:spPr>
+          <a:xfrm>
+            <a:off x="129114" y="198363"/>
+            <a:ext cx="4310365" cy="911404"/>
+          </a:xfrm>
+          <a:prstGeom prst="rect">
+            <a:avLst/>
+          </a:prstGeom>
+          <a:noFill/>
+          <a:effectLst>
+            <a:outerShdw blurRad="50800" dist="25400" dir="2700000" algn="tl" rotWithShape="0">
+              <a:prstClr val="black">
+                <a:alpha val="40000"/>
+              </a:prstClr>
+            </a:outerShdw>
+          </a:effectLst>
+        </p:spPr>
+        <p:txBody>
+          <a:bodyPr wrap="square" lIns="292988" tIns="146495" rIns="292988" bIns="146495" rtlCol="0">
+            <a:spAutoFit/>
+          </a:bodyPr>
+          <a:lstStyle/>
+          <a:p>
+            <a:pPr algn="ctr"/>
+            <a:r>
+              <a:rPr lang="en-US" sz="4000" dirty="0" smtClean="0">
+                <a:latin typeface="Raleway ExtraLight"/>
+                <a:cs typeface="Raleway ExtraLight"/>
+              </a:rPr>
+              <a:t>BEST PICTURE</a:t>
+            </a:r>
+            <a:endParaRPr lang="en-US" sz="4000" dirty="0">
+              <a:latin typeface="Raleway ExtraLight"/>
+              <a:cs typeface="Raleway ExtraLight"/>
+            </a:endParaRPr>
+          </a:p>
+        </p:txBody>
+      </p:sp>
+      <p:cxnSp>
+        <p:nvCxnSpPr>
+          <p:cNvPr id="3" name="Straight Connector 2"/>
+          <p:cNvCxnSpPr/>
+          <p:nvPr/>
+        </p:nvCxnSpPr>
+        <p:spPr>
+          <a:xfrm flipH="1">
+            <a:off x="715433" y="272184"/>
+            <a:ext cx="656781" cy="0"/>
+          </a:xfrm>
+          <a:prstGeom prst="line">
+            <a:avLst/>
+          </a:prstGeom>
+          <a:ln w="6350" cmpd="sng">
+            <a:solidFill>
+              <a:schemeClr val="tx1"/>
+            </a:solidFill>
+          </a:ln>
+          <a:effectLst/>
+        </p:spPr>
+        <p:style>
+          <a:lnRef idx="2">
+            <a:schemeClr val="accent1"/>
+          </a:lnRef>
+          <a:fillRef idx="0">
+            <a:schemeClr val="accent1"/>
+          </a:fillRef>
+          <a:effectRef idx="1">
+            <a:schemeClr val="accent1"/>
+          </a:effectRef>
+          <a:fontRef idx="minor">
+            <a:schemeClr val="tx1"/>
+          </a:fontRef>
+        </p:style>
+      </p:cxnSp>
+      <p:cxnSp>
+        <p:nvCxnSpPr>
+          <p:cNvPr id="51" name="Straight Connector 50"/>
+          <p:cNvCxnSpPr/>
+          <p:nvPr/>
+        </p:nvCxnSpPr>
+        <p:spPr>
+          <a:xfrm flipH="1">
+            <a:off x="3183469" y="272184"/>
+            <a:ext cx="656781" cy="0"/>
+          </a:xfrm>
+          <a:prstGeom prst="line">
+            <a:avLst/>
+          </a:prstGeom>
+          <a:ln w="6350" cmpd="sng">
+            <a:solidFill>
+              <a:schemeClr val="tx1"/>
+            </a:solidFill>
+          </a:ln>
+          <a:effectLst/>
+        </p:spPr>
+        <p:style>
+          <a:lnRef idx="2">
+            <a:schemeClr val="accent1"/>
+          </a:lnRef>
+          <a:fillRef idx="0">
+            <a:schemeClr val="accent1"/>
+          </a:fillRef>
+          <a:effectRef idx="1">
+            <a:schemeClr val="accent1"/>
+          </a:effectRef>
+          <a:fontRef idx="minor">
+            <a:schemeClr val="tx1"/>
+          </a:fontRef>
+        </p:style>
+      </p:cxnSp>
     </p:spTree>
     <p:extLst>
       <p:ext uri="{BB962C8B-B14F-4D97-AF65-F5344CB8AC3E}">
@@ -6269,7 +6302,7 @@
   <p:timing>
     <p:tnLst>
       <p:par>
-        <p:cTn id="1" dur="indefinite" restart="never" nodeType="tmRoot"/>
+        <p:cTn xmlns:p14="http://schemas.microsoft.com/office/powerpoint/2010/main" id="1" dur="indefinite" restart="never" nodeType="tmRoot"/>
       </p:par>
     </p:tnLst>
   </p:timing>

</xml_diff>